<commit_message>
create model figure memo
</commit_message>
<xml_diff>
--- a/doc/kurihara/fig_simulater_model.pptx
+++ b/doc/kurihara/fig_simulater_model.pptx
@@ -3298,7 +3298,15 @@
           <a:p>
             <a:r>
               <a:rPr lang="en-US" altLang="ja-JP" dirty="0" smtClean="0"/>
-              <a:t>Method : move()</a:t>
+              <a:t>Method : move</a:t>
+            </a:r>
+            <a:r>
+              <a:rPr lang="en-US" altLang="ja-JP" dirty="0" smtClean="0"/>
+              <a:t>(),</a:t>
+            </a:r>
+            <a:r>
+              <a:rPr lang="en-US" altLang="ja-JP" dirty="0" smtClean="0"/>
+              <a:t/>
             </a:r>
             <a:br>
               <a:rPr lang="en-US" altLang="ja-JP" dirty="0" smtClean="0"/>
@@ -3362,7 +3370,15 @@
           <a:p>
             <a:r>
               <a:rPr lang="en-US" altLang="ja-JP" dirty="0" smtClean="0"/>
-              <a:t>Method: create()</a:t>
+              <a:t>Method: create</a:t>
+            </a:r>
+            <a:r>
+              <a:rPr lang="en-US" altLang="ja-JP" dirty="0" smtClean="0"/>
+              <a:t>(),</a:t>
+            </a:r>
+            <a:r>
+              <a:rPr lang="en-US" altLang="ja-JP" dirty="0" smtClean="0"/>
+              <a:t/>
             </a:r>
             <a:br>
               <a:rPr lang="en-US" altLang="ja-JP" dirty="0" smtClean="0"/>
@@ -3422,7 +3438,15 @@
           <a:p>
             <a:r>
               <a:rPr lang="en-US" altLang="ja-JP" dirty="0" smtClean="0"/>
-              <a:t>Method : move()</a:t>
+              <a:t>Method : move</a:t>
+            </a:r>
+            <a:r>
+              <a:rPr lang="en-US" altLang="ja-JP" dirty="0" smtClean="0"/>
+              <a:t>(),</a:t>
+            </a:r>
+            <a:r>
+              <a:rPr lang="en-US" altLang="ja-JP" dirty="0" smtClean="0"/>
+              <a:t/>
             </a:r>
             <a:br>
               <a:rPr lang="en-US" altLang="ja-JP" dirty="0" smtClean="0"/>
@@ -3524,8 +3548,21 @@
           <a:p>
             <a:r>
               <a:rPr lang="en-US" altLang="ja-JP" dirty="0" smtClean="0"/>
-              <a:t>Method : update()</a:t>
-            </a:r>
+              <a:t>Method : update</a:t>
+            </a:r>
+            <a:r>
+              <a:rPr lang="en-US" altLang="ja-JP" smtClean="0"/>
+              <a:t>(), 	</a:t>
+            </a:r>
+            <a:r>
+              <a:rPr lang="en-US" altLang="ja-JP" dirty="0" err="1" smtClean="0"/>
+              <a:t>checkCollision</a:t>
+            </a:r>
+            <a:r>
+              <a:rPr lang="en-US" altLang="ja-JP" dirty="0" smtClean="0"/>
+              <a:t>()</a:t>
+            </a:r>
+            <a:endParaRPr lang="en-US" altLang="ja-JP" dirty="0" smtClean="0"/>
           </a:p>
           <a:p>
             <a:r>
@@ -3682,7 +3719,7 @@
         <p:spPr>
           <a:xfrm>
             <a:off x="178903" y="178906"/>
-            <a:ext cx="11469757" cy="5943598"/>
+            <a:ext cx="11509334" cy="5943598"/>
           </a:xfrm>
           <a:prstGeom prst="rect">
             <a:avLst/>
@@ -4330,7 +4367,15 @@
           <a:p>
             <a:r>
               <a:rPr lang="en-US" altLang="ja-JP" dirty="0" smtClean="0"/>
-              <a:t>Method: create()</a:t>
+              <a:t>Method: create</a:t>
+            </a:r>
+            <a:r>
+              <a:rPr lang="en-US" altLang="ja-JP" dirty="0" smtClean="0"/>
+              <a:t>(),</a:t>
+            </a:r>
+            <a:r>
+              <a:rPr lang="en-US" altLang="ja-JP" dirty="0" smtClean="0"/>
+              <a:t/>
             </a:r>
             <a:br>
               <a:rPr lang="en-US" altLang="ja-JP" dirty="0" smtClean="0"/>

</xml_diff>